<commit_message>
edits to graphs and ppt
</commit_message>
<xml_diff>
--- a/figures/Figures.pptx
+++ b/figures/Figures.pptx
@@ -5,14 +5,23 @@
     <p:sldMasterId id="2147483648" r:id="rId1"/>
   </p:sldMasterIdLst>
   <p:sldIdLst>
-    <p:sldId id="256" r:id="rId2"/>
-    <p:sldId id="257" r:id="rId3"/>
-    <p:sldId id="258" r:id="rId4"/>
-    <p:sldId id="259" r:id="rId5"/>
-    <p:sldId id="260" r:id="rId6"/>
-    <p:sldId id="261" r:id="rId7"/>
-    <p:sldId id="262" r:id="rId8"/>
-    <p:sldId id="263" r:id="rId9"/>
+    <p:sldId id="262" r:id="rId2"/>
+    <p:sldId id="273" r:id="rId3"/>
+    <p:sldId id="268" r:id="rId4"/>
+    <p:sldId id="272" r:id="rId5"/>
+    <p:sldId id="256" r:id="rId6"/>
+    <p:sldId id="257" r:id="rId7"/>
+    <p:sldId id="264" r:id="rId8"/>
+    <p:sldId id="265" r:id="rId9"/>
+    <p:sldId id="266" r:id="rId10"/>
+    <p:sldId id="267" r:id="rId11"/>
+    <p:sldId id="269" r:id="rId12"/>
+    <p:sldId id="261" r:id="rId13"/>
+    <p:sldId id="263" r:id="rId14"/>
+    <p:sldId id="270" r:id="rId15"/>
+    <p:sldId id="271" r:id="rId16"/>
+    <p:sldId id="258" r:id="rId17"/>
+    <p:sldId id="260" r:id="rId18"/>
   </p:sldIdLst>
   <p:sldSz cx="12192000" cy="6858000"/>
   <p:notesSz cx="6858000" cy="9144000"/>
@@ -111,6 +120,11 @@
       </a:defRPr>
     </a:lvl9pPr>
   </p:defaultTextStyle>
+  <p:extLst>
+    <p:ext uri="{EFAFB233-063F-42B5-8137-9DF3F51BA10A}">
+      <p15:sldGuideLst xmlns:p15="http://schemas.microsoft.com/office/powerpoint/2012/main"/>
+    </p:ext>
+  </p:extLst>
 </p:presentation>
 </file>
 
@@ -245,7 +259,7 @@
           <a:p>
             <a:fld id="{F30FD078-D252-C04B-AF68-63026516BD4D}" type="datetimeFigureOut">
               <a:rPr lang="en-US" smtClean="0"/>
-              <a:t>7/12/16</a:t>
+              <a:t>7/14/16</a:t>
             </a:fld>
             <a:endParaRPr lang="en-US"/>
           </a:p>
@@ -415,7 +429,7 @@
           <a:p>
             <a:fld id="{F30FD078-D252-C04B-AF68-63026516BD4D}" type="datetimeFigureOut">
               <a:rPr lang="en-US" smtClean="0"/>
-              <a:t>7/12/16</a:t>
+              <a:t>7/14/16</a:t>
             </a:fld>
             <a:endParaRPr lang="en-US"/>
           </a:p>
@@ -595,7 +609,7 @@
           <a:p>
             <a:fld id="{F30FD078-D252-C04B-AF68-63026516BD4D}" type="datetimeFigureOut">
               <a:rPr lang="en-US" smtClean="0"/>
-              <a:t>7/12/16</a:t>
+              <a:t>7/14/16</a:t>
             </a:fld>
             <a:endParaRPr lang="en-US"/>
           </a:p>
@@ -765,7 +779,7 @@
           <a:p>
             <a:fld id="{F30FD078-D252-C04B-AF68-63026516BD4D}" type="datetimeFigureOut">
               <a:rPr lang="en-US" smtClean="0"/>
-              <a:t>7/12/16</a:t>
+              <a:t>7/14/16</a:t>
             </a:fld>
             <a:endParaRPr lang="en-US"/>
           </a:p>
@@ -1011,7 +1025,7 @@
           <a:p>
             <a:fld id="{F30FD078-D252-C04B-AF68-63026516BD4D}" type="datetimeFigureOut">
               <a:rPr lang="en-US" smtClean="0"/>
-              <a:t>7/12/16</a:t>
+              <a:t>7/14/16</a:t>
             </a:fld>
             <a:endParaRPr lang="en-US"/>
           </a:p>
@@ -1243,7 +1257,7 @@
           <a:p>
             <a:fld id="{F30FD078-D252-C04B-AF68-63026516BD4D}" type="datetimeFigureOut">
               <a:rPr lang="en-US" smtClean="0"/>
-              <a:t>7/12/16</a:t>
+              <a:t>7/14/16</a:t>
             </a:fld>
             <a:endParaRPr lang="en-US"/>
           </a:p>
@@ -1610,7 +1624,7 @@
           <a:p>
             <a:fld id="{F30FD078-D252-C04B-AF68-63026516BD4D}" type="datetimeFigureOut">
               <a:rPr lang="en-US" smtClean="0"/>
-              <a:t>7/12/16</a:t>
+              <a:t>7/14/16</a:t>
             </a:fld>
             <a:endParaRPr lang="en-US"/>
           </a:p>
@@ -1728,7 +1742,7 @@
           <a:p>
             <a:fld id="{F30FD078-D252-C04B-AF68-63026516BD4D}" type="datetimeFigureOut">
               <a:rPr lang="en-US" smtClean="0"/>
-              <a:t>7/12/16</a:t>
+              <a:t>7/14/16</a:t>
             </a:fld>
             <a:endParaRPr lang="en-US"/>
           </a:p>
@@ -1823,7 +1837,7 @@
           <a:p>
             <a:fld id="{F30FD078-D252-C04B-AF68-63026516BD4D}" type="datetimeFigureOut">
               <a:rPr lang="en-US" smtClean="0"/>
-              <a:t>7/12/16</a:t>
+              <a:t>7/14/16</a:t>
             </a:fld>
             <a:endParaRPr lang="en-US"/>
           </a:p>
@@ -2100,7 +2114,7 @@
           <a:p>
             <a:fld id="{F30FD078-D252-C04B-AF68-63026516BD4D}" type="datetimeFigureOut">
               <a:rPr lang="en-US" smtClean="0"/>
-              <a:t>7/12/16</a:t>
+              <a:t>7/14/16</a:t>
             </a:fld>
             <a:endParaRPr lang="en-US"/>
           </a:p>
@@ -2353,7 +2367,7 @@
           <a:p>
             <a:fld id="{F30FD078-D252-C04B-AF68-63026516BD4D}" type="datetimeFigureOut">
               <a:rPr lang="en-US" smtClean="0"/>
-              <a:t>7/12/16</a:t>
+              <a:t>7/14/16</a:t>
             </a:fld>
             <a:endParaRPr lang="en-US"/>
           </a:p>
@@ -2566,7 +2580,7 @@
           <a:p>
             <a:fld id="{F30FD078-D252-C04B-AF68-63026516BD4D}" type="datetimeFigureOut">
               <a:rPr lang="en-US" smtClean="0"/>
-              <a:t>7/12/16</a:t>
+              <a:t>7/14/16</a:t>
             </a:fld>
             <a:endParaRPr lang="en-US"/>
           </a:p>
@@ -2973,7 +2987,7 @@
       </p:grpSpPr>
       <p:sp>
         <p:nvSpPr>
-          <p:cNvPr id="5" name="Title 4"/>
+          <p:cNvPr id="2" name="Title 1"/>
           <p:cNvSpPr>
             <a:spLocks noGrp="1"/>
           </p:cNvSpPr>
@@ -2983,26 +2997,670 @@
         </p:nvSpPr>
         <p:spPr>
           <a:xfrm>
-            <a:off x="4624892" y="2150895"/>
-            <a:ext cx="2701066" cy="1517463"/>
-          </a:xfrm>
-        </p:spPr>
-        <p:txBody>
-          <a:bodyPr/>
-          <a:lstStyle/>
-          <a:p>
-            <a:r>
-              <a:rPr lang="en-US" smtClean="0"/>
-              <a:t>Part 1.</a:t>
-            </a:r>
-            <a:endParaRPr lang="en-US"/>
+            <a:off x="4420497" y="2473624"/>
+            <a:ext cx="2776369" cy="1635797"/>
+          </a:xfrm>
+        </p:spPr>
+        <p:txBody>
+          <a:bodyPr/>
+          <a:lstStyle/>
+          <a:p>
+            <a:r>
+              <a:rPr lang="en-US" dirty="0" smtClean="0"/>
+              <a:t>Part </a:t>
+            </a:r>
+            <a:r>
+              <a:rPr lang="en-US" dirty="0" smtClean="0"/>
+              <a:t>5.</a:t>
+            </a:r>
+            <a:endParaRPr lang="en-US" dirty="0"/>
           </a:p>
         </p:txBody>
       </p:sp>
     </p:spTree>
     <p:extLst>
       <p:ext uri="{BB962C8B-B14F-4D97-AF65-F5344CB8AC3E}">
-        <p14:creationId xmlns:p14="http://schemas.microsoft.com/office/powerpoint/2010/main" val="224123390"/>
+        <p14:creationId xmlns:p14="http://schemas.microsoft.com/office/powerpoint/2010/main" val="2128973067"/>
+      </p:ext>
+    </p:extLst>
+  </p:cSld>
+  <p:clrMapOvr>
+    <a:masterClrMapping/>
+  </p:clrMapOvr>
+</p:sld>
+</file>
+
+<file path=ppt/slides/slide10.xml><?xml version="1.0" encoding="utf-8"?>
+<p:sld xmlns:a="http://schemas.openxmlformats.org/drawingml/2006/main" xmlns:r="http://schemas.openxmlformats.org/officeDocument/2006/relationships" xmlns:p="http://schemas.openxmlformats.org/presentationml/2006/main">
+  <p:cSld>
+    <p:spTree>
+      <p:nvGrpSpPr>
+        <p:cNvPr id="1" name=""/>
+        <p:cNvGrpSpPr/>
+        <p:nvPr/>
+      </p:nvGrpSpPr>
+      <p:grpSpPr>
+        <a:xfrm>
+          <a:off x="0" y="0"/>
+          <a:ext cx="0" cy="0"/>
+          <a:chOff x="0" y="0"/>
+          <a:chExt cx="0" cy="0"/>
+        </a:xfrm>
+      </p:grpSpPr>
+      <p:pic>
+        <p:nvPicPr>
+          <p:cNvPr id="2" name="Picture 1"/>
+          <p:cNvPicPr>
+            <a:picLocks noChangeAspect="1"/>
+          </p:cNvPicPr>
+          <p:nvPr/>
+        </p:nvPicPr>
+        <p:blipFill>
+          <a:blip r:embed="rId2">
+            <a:extLst>
+              <a:ext uri="{28A0092B-C50C-407E-A947-70E740481C1C}">
+                <a14:useLocalDpi xmlns:a14="http://schemas.microsoft.com/office/drawing/2010/main" val="0"/>
+              </a:ext>
+            </a:extLst>
+          </a:blip>
+          <a:stretch>
+            <a:fillRect/>
+          </a:stretch>
+        </p:blipFill>
+        <p:spPr>
+          <a:xfrm>
+            <a:off x="2044700" y="508000"/>
+            <a:ext cx="8102600" cy="5842000"/>
+          </a:xfrm>
+          <a:prstGeom prst="rect">
+            <a:avLst/>
+          </a:prstGeom>
+        </p:spPr>
+      </p:pic>
+      <p:sp>
+        <p:nvSpPr>
+          <p:cNvPr id="3" name="TextBox 2"/>
+          <p:cNvSpPr txBox="1"/>
+          <p:nvPr/>
+        </p:nvSpPr>
+        <p:spPr>
+          <a:xfrm>
+            <a:off x="408791" y="138668"/>
+            <a:ext cx="4834337" cy="369332"/>
+          </a:xfrm>
+          <a:prstGeom prst="rect">
+            <a:avLst/>
+          </a:prstGeom>
+          <a:noFill/>
+        </p:spPr>
+        <p:txBody>
+          <a:bodyPr wrap="none" rtlCol="0">
+            <a:spAutoFit/>
+          </a:bodyPr>
+          <a:lstStyle/>
+          <a:p>
+            <a:r>
+              <a:rPr lang="en-US" dirty="0" smtClean="0"/>
+              <a:t>What was your main reason for change? - Canada</a:t>
+            </a:r>
+            <a:endParaRPr lang="en-US" dirty="0"/>
+          </a:p>
+        </p:txBody>
+      </p:sp>
+    </p:spTree>
+    <p:extLst>
+      <p:ext uri="{BB962C8B-B14F-4D97-AF65-F5344CB8AC3E}">
+        <p14:creationId xmlns:p14="http://schemas.microsoft.com/office/powerpoint/2010/main" val="1205226062"/>
+      </p:ext>
+    </p:extLst>
+  </p:cSld>
+  <p:clrMapOvr>
+    <a:masterClrMapping/>
+  </p:clrMapOvr>
+</p:sld>
+</file>
+
+<file path=ppt/slides/slide11.xml><?xml version="1.0" encoding="utf-8"?>
+<p:sld xmlns:a="http://schemas.openxmlformats.org/drawingml/2006/main" xmlns:r="http://schemas.openxmlformats.org/officeDocument/2006/relationships" xmlns:p="http://schemas.openxmlformats.org/presentationml/2006/main">
+  <p:cSld>
+    <p:spTree>
+      <p:nvGrpSpPr>
+        <p:cNvPr id="1" name=""/>
+        <p:cNvGrpSpPr/>
+        <p:nvPr/>
+      </p:nvGrpSpPr>
+      <p:grpSpPr>
+        <a:xfrm>
+          <a:off x="0" y="0"/>
+          <a:ext cx="0" cy="0"/>
+          <a:chOff x="0" y="0"/>
+          <a:chExt cx="0" cy="0"/>
+        </a:xfrm>
+      </p:grpSpPr>
+      <p:sp>
+        <p:nvSpPr>
+          <p:cNvPr id="2" name="Title 1"/>
+          <p:cNvSpPr>
+            <a:spLocks noGrp="1"/>
+          </p:cNvSpPr>
+          <p:nvPr>
+            <p:ph type="title"/>
+          </p:nvPr>
+        </p:nvSpPr>
+        <p:spPr>
+          <a:xfrm>
+            <a:off x="4549588" y="2430593"/>
+            <a:ext cx="2883946" cy="1173219"/>
+          </a:xfrm>
+        </p:spPr>
+        <p:txBody>
+          <a:bodyPr/>
+          <a:lstStyle/>
+          <a:p>
+            <a:r>
+              <a:rPr lang="en-US" dirty="0" smtClean="0"/>
+              <a:t>Part 4</a:t>
+            </a:r>
+            <a:endParaRPr lang="en-US" dirty="0"/>
+          </a:p>
+        </p:txBody>
+      </p:sp>
+    </p:spTree>
+    <p:extLst>
+      <p:ext uri="{BB962C8B-B14F-4D97-AF65-F5344CB8AC3E}">
+        <p14:creationId xmlns:p14="http://schemas.microsoft.com/office/powerpoint/2010/main" val="1986735978"/>
+      </p:ext>
+    </p:extLst>
+  </p:cSld>
+  <p:clrMapOvr>
+    <a:masterClrMapping/>
+  </p:clrMapOvr>
+</p:sld>
+</file>
+
+<file path=ppt/slides/slide12.xml><?xml version="1.0" encoding="utf-8"?>
+<p:sld xmlns:a="http://schemas.openxmlformats.org/drawingml/2006/main" xmlns:r="http://schemas.openxmlformats.org/officeDocument/2006/relationships" xmlns:p="http://schemas.openxmlformats.org/presentationml/2006/main">
+  <p:cSld>
+    <p:spTree>
+      <p:nvGrpSpPr>
+        <p:cNvPr id="1" name=""/>
+        <p:cNvGrpSpPr/>
+        <p:nvPr/>
+      </p:nvGrpSpPr>
+      <p:grpSpPr>
+        <a:xfrm>
+          <a:off x="0" y="0"/>
+          <a:ext cx="0" cy="0"/>
+          <a:chOff x="0" y="0"/>
+          <a:chExt cx="0" cy="0"/>
+        </a:xfrm>
+      </p:grpSpPr>
+      <p:pic>
+        <p:nvPicPr>
+          <p:cNvPr id="2" name="Picture 1"/>
+          <p:cNvPicPr>
+            <a:picLocks noChangeAspect="1"/>
+          </p:cNvPicPr>
+          <p:nvPr/>
+        </p:nvPicPr>
+        <p:blipFill>
+          <a:blip r:embed="rId2">
+            <a:extLst>
+              <a:ext uri="{28A0092B-C50C-407E-A947-70E740481C1C}">
+                <a14:useLocalDpi xmlns:a14="http://schemas.microsoft.com/office/drawing/2010/main" val="0"/>
+              </a:ext>
+            </a:extLst>
+          </a:blip>
+          <a:stretch>
+            <a:fillRect/>
+          </a:stretch>
+        </p:blipFill>
+        <p:spPr>
+          <a:xfrm>
+            <a:off x="2066215" y="713577"/>
+            <a:ext cx="8102600" cy="5842000"/>
+          </a:xfrm>
+          <a:prstGeom prst="rect">
+            <a:avLst/>
+          </a:prstGeom>
+        </p:spPr>
+      </p:pic>
+      <p:sp>
+        <p:nvSpPr>
+          <p:cNvPr id="3" name="TextBox 2"/>
+          <p:cNvSpPr txBox="1"/>
+          <p:nvPr/>
+        </p:nvSpPr>
+        <p:spPr>
+          <a:xfrm>
+            <a:off x="580913" y="344245"/>
+            <a:ext cx="10479215" cy="369332"/>
+          </a:xfrm>
+          <a:prstGeom prst="rect">
+            <a:avLst/>
+          </a:prstGeom>
+          <a:noFill/>
+        </p:spPr>
+        <p:txBody>
+          <a:bodyPr wrap="none" rtlCol="0">
+            <a:spAutoFit/>
+          </a:bodyPr>
+          <a:lstStyle/>
+          <a:p>
+            <a:r>
+              <a:rPr lang="en-US" dirty="0" smtClean="0"/>
+              <a:t>In your opinion, how important is fundamental research to the government in your country of work? - Canada</a:t>
+            </a:r>
+            <a:endParaRPr lang="en-US" dirty="0"/>
+          </a:p>
+        </p:txBody>
+      </p:sp>
+    </p:spTree>
+    <p:extLst>
+      <p:ext uri="{BB962C8B-B14F-4D97-AF65-F5344CB8AC3E}">
+        <p14:creationId xmlns:p14="http://schemas.microsoft.com/office/powerpoint/2010/main" val="710820581"/>
+      </p:ext>
+    </p:extLst>
+  </p:cSld>
+  <p:clrMapOvr>
+    <a:masterClrMapping/>
+  </p:clrMapOvr>
+</p:sld>
+</file>
+
+<file path=ppt/slides/slide13.xml><?xml version="1.0" encoding="utf-8"?>
+<p:sld xmlns:a="http://schemas.openxmlformats.org/drawingml/2006/main" xmlns:r="http://schemas.openxmlformats.org/officeDocument/2006/relationships" xmlns:p="http://schemas.openxmlformats.org/presentationml/2006/main">
+  <p:cSld>
+    <p:spTree>
+      <p:nvGrpSpPr>
+        <p:cNvPr id="1" name=""/>
+        <p:cNvGrpSpPr/>
+        <p:nvPr/>
+      </p:nvGrpSpPr>
+      <p:grpSpPr>
+        <a:xfrm>
+          <a:off x="0" y="0"/>
+          <a:ext cx="0" cy="0"/>
+          <a:chOff x="0" y="0"/>
+          <a:chExt cx="0" cy="0"/>
+        </a:xfrm>
+      </p:grpSpPr>
+      <p:sp>
+        <p:nvSpPr>
+          <p:cNvPr id="2" name="Title 1"/>
+          <p:cNvSpPr>
+            <a:spLocks noGrp="1"/>
+          </p:cNvSpPr>
+          <p:nvPr>
+            <p:ph type="title"/>
+          </p:nvPr>
+        </p:nvSpPr>
+        <p:spPr>
+          <a:xfrm>
+            <a:off x="838200" y="0"/>
+            <a:ext cx="10515600" cy="1325563"/>
+          </a:xfrm>
+        </p:spPr>
+        <p:txBody>
+          <a:bodyPr>
+            <a:noAutofit/>
+          </a:bodyPr>
+          <a:lstStyle/>
+          <a:p>
+            <a:r>
+              <a:rPr lang="en-US" sz="2000" dirty="0" smtClean="0"/>
+              <a:t>In the past 10 </a:t>
+            </a:r>
+            <a:r>
+              <a:rPr lang="en-US" sz="2000" dirty="0" err="1" smtClean="0"/>
+              <a:t>yrs</a:t>
+            </a:r>
+            <a:r>
+              <a:rPr lang="en-US" sz="2000" dirty="0" smtClean="0"/>
+              <a:t>, have any type(s) of research become a higher priority for the government in your country of work? - Canada</a:t>
+            </a:r>
+            <a:endParaRPr lang="en-US" sz="2000" dirty="0"/>
+          </a:p>
+        </p:txBody>
+      </p:sp>
+      <p:pic>
+        <p:nvPicPr>
+          <p:cNvPr id="3" name="Picture 2"/>
+          <p:cNvPicPr>
+            <a:picLocks noChangeAspect="1"/>
+          </p:cNvPicPr>
+          <p:nvPr/>
+        </p:nvPicPr>
+        <p:blipFill>
+          <a:blip r:embed="rId2">
+            <a:extLst>
+              <a:ext uri="{28A0092B-C50C-407E-A947-70E740481C1C}">
+                <a14:useLocalDpi xmlns:a14="http://schemas.microsoft.com/office/drawing/2010/main" val="0"/>
+              </a:ext>
+            </a:extLst>
+          </a:blip>
+          <a:stretch>
+            <a:fillRect/>
+          </a:stretch>
+        </p:blipFill>
+        <p:spPr>
+          <a:xfrm>
+            <a:off x="2044700" y="1144545"/>
+            <a:ext cx="7443545" cy="5366819"/>
+          </a:xfrm>
+          <a:prstGeom prst="rect">
+            <a:avLst/>
+          </a:prstGeom>
+        </p:spPr>
+      </p:pic>
+    </p:spTree>
+    <p:extLst>
+      <p:ext uri="{BB962C8B-B14F-4D97-AF65-F5344CB8AC3E}">
+        <p14:creationId xmlns:p14="http://schemas.microsoft.com/office/powerpoint/2010/main" val="535910707"/>
+      </p:ext>
+    </p:extLst>
+  </p:cSld>
+  <p:clrMapOvr>
+    <a:masterClrMapping/>
+  </p:clrMapOvr>
+</p:sld>
+</file>
+
+<file path=ppt/slides/slide14.xml><?xml version="1.0" encoding="utf-8"?>
+<p:sld xmlns:a="http://schemas.openxmlformats.org/drawingml/2006/main" xmlns:r="http://schemas.openxmlformats.org/officeDocument/2006/relationships" xmlns:p="http://schemas.openxmlformats.org/presentationml/2006/main">
+  <p:cSld>
+    <p:spTree>
+      <p:nvGrpSpPr>
+        <p:cNvPr id="1" name=""/>
+        <p:cNvGrpSpPr/>
+        <p:nvPr/>
+      </p:nvGrpSpPr>
+      <p:grpSpPr>
+        <a:xfrm>
+          <a:off x="0" y="0"/>
+          <a:ext cx="0" cy="0"/>
+          <a:chOff x="0" y="0"/>
+          <a:chExt cx="0" cy="0"/>
+        </a:xfrm>
+      </p:grpSpPr>
+      <p:sp>
+        <p:nvSpPr>
+          <p:cNvPr id="2" name="Title 1"/>
+          <p:cNvSpPr>
+            <a:spLocks noGrp="1"/>
+          </p:cNvSpPr>
+          <p:nvPr>
+            <p:ph type="title"/>
+          </p:nvPr>
+        </p:nvSpPr>
+        <p:spPr>
+          <a:xfrm>
+            <a:off x="558501" y="0"/>
+            <a:ext cx="10515600" cy="1325563"/>
+          </a:xfrm>
+        </p:spPr>
+        <p:txBody>
+          <a:bodyPr>
+            <a:noAutofit/>
+          </a:bodyPr>
+          <a:lstStyle/>
+          <a:p>
+            <a:r>
+              <a:rPr lang="en-US" sz="2000" dirty="0" smtClean="0"/>
+              <a:t>Do you think the availability of research funding will change in your county of work in the next 5 </a:t>
+            </a:r>
+            <a:r>
+              <a:rPr lang="en-US" sz="2000" dirty="0" err="1" smtClean="0"/>
+              <a:t>yrs</a:t>
+            </a:r>
+            <a:r>
+              <a:rPr lang="en-US" sz="2000" dirty="0" smtClean="0"/>
+              <a:t>? - Canada</a:t>
+            </a:r>
+            <a:endParaRPr lang="en-US" sz="2000" dirty="0"/>
+          </a:p>
+        </p:txBody>
+      </p:sp>
+      <p:pic>
+        <p:nvPicPr>
+          <p:cNvPr id="3" name="Picture 2"/>
+          <p:cNvPicPr>
+            <a:picLocks noChangeAspect="1"/>
+          </p:cNvPicPr>
+          <p:nvPr/>
+        </p:nvPicPr>
+        <p:blipFill>
+          <a:blip r:embed="rId2">
+            <a:extLst>
+              <a:ext uri="{28A0092B-C50C-407E-A947-70E740481C1C}">
+                <a14:useLocalDpi xmlns:a14="http://schemas.microsoft.com/office/drawing/2010/main" val="0"/>
+              </a:ext>
+            </a:extLst>
+          </a:blip>
+          <a:stretch>
+            <a:fillRect/>
+          </a:stretch>
+        </p:blipFill>
+        <p:spPr>
+          <a:xfrm>
+            <a:off x="2055457" y="873760"/>
+            <a:ext cx="8102600" cy="5842000"/>
+          </a:xfrm>
+          <a:prstGeom prst="rect">
+            <a:avLst/>
+          </a:prstGeom>
+        </p:spPr>
+      </p:pic>
+    </p:spTree>
+    <p:extLst>
+      <p:ext uri="{BB962C8B-B14F-4D97-AF65-F5344CB8AC3E}">
+        <p14:creationId xmlns:p14="http://schemas.microsoft.com/office/powerpoint/2010/main" val="1428673900"/>
+      </p:ext>
+    </p:extLst>
+  </p:cSld>
+  <p:clrMapOvr>
+    <a:masterClrMapping/>
+  </p:clrMapOvr>
+</p:sld>
+</file>
+
+<file path=ppt/slides/slide15.xml><?xml version="1.0" encoding="utf-8"?>
+<p:sld xmlns:a="http://schemas.openxmlformats.org/drawingml/2006/main" xmlns:r="http://schemas.openxmlformats.org/officeDocument/2006/relationships" xmlns:p="http://schemas.openxmlformats.org/presentationml/2006/main">
+  <p:cSld>
+    <p:spTree>
+      <p:nvGrpSpPr>
+        <p:cNvPr id="1" name=""/>
+        <p:cNvGrpSpPr/>
+        <p:nvPr/>
+      </p:nvGrpSpPr>
+      <p:grpSpPr>
+        <a:xfrm>
+          <a:off x="0" y="0"/>
+          <a:ext cx="0" cy="0"/>
+          <a:chOff x="0" y="0"/>
+          <a:chExt cx="0" cy="0"/>
+        </a:xfrm>
+      </p:grpSpPr>
+      <p:sp>
+        <p:nvSpPr>
+          <p:cNvPr id="2" name="Title 1"/>
+          <p:cNvSpPr>
+            <a:spLocks noGrp="1"/>
+          </p:cNvSpPr>
+          <p:nvPr>
+            <p:ph type="title"/>
+          </p:nvPr>
+        </p:nvSpPr>
+        <p:spPr>
+          <a:xfrm>
+            <a:off x="591671" y="0"/>
+            <a:ext cx="10557734" cy="1011219"/>
+          </a:xfrm>
+        </p:spPr>
+        <p:txBody>
+          <a:bodyPr>
+            <a:noAutofit/>
+          </a:bodyPr>
+          <a:lstStyle/>
+          <a:p>
+            <a:r>
+              <a:rPr lang="en-US" sz="2000" dirty="0" smtClean="0"/>
+              <a:t>Do you think changes in funding availability in your country of work will influence the likelihood of the next generation to pursue careers in research? - Canada</a:t>
+            </a:r>
+            <a:endParaRPr lang="en-US" sz="2000" dirty="0"/>
+          </a:p>
+        </p:txBody>
+      </p:sp>
+      <p:pic>
+        <p:nvPicPr>
+          <p:cNvPr id="3" name="Picture 2"/>
+          <p:cNvPicPr>
+            <a:picLocks noChangeAspect="1"/>
+          </p:cNvPicPr>
+          <p:nvPr/>
+        </p:nvPicPr>
+        <p:blipFill>
+          <a:blip r:embed="rId2">
+            <a:extLst>
+              <a:ext uri="{28A0092B-C50C-407E-A947-70E740481C1C}">
+                <a14:useLocalDpi xmlns:a14="http://schemas.microsoft.com/office/drawing/2010/main" val="0"/>
+              </a:ext>
+            </a:extLst>
+          </a:blip>
+          <a:stretch>
+            <a:fillRect/>
+          </a:stretch>
+        </p:blipFill>
+        <p:spPr>
+          <a:xfrm>
+            <a:off x="2044700" y="830730"/>
+            <a:ext cx="8102600" cy="5842000"/>
+          </a:xfrm>
+          <a:prstGeom prst="rect">
+            <a:avLst/>
+          </a:prstGeom>
+        </p:spPr>
+      </p:pic>
+    </p:spTree>
+    <p:extLst>
+      <p:ext uri="{BB962C8B-B14F-4D97-AF65-F5344CB8AC3E}">
+        <p14:creationId xmlns:p14="http://schemas.microsoft.com/office/powerpoint/2010/main" val="246416665"/>
+      </p:ext>
+    </p:extLst>
+  </p:cSld>
+  <p:clrMapOvr>
+    <a:masterClrMapping/>
+  </p:clrMapOvr>
+</p:sld>
+</file>
+
+<file path=ppt/slides/slide16.xml><?xml version="1.0" encoding="utf-8"?>
+<p:sld xmlns:a="http://schemas.openxmlformats.org/drawingml/2006/main" xmlns:r="http://schemas.openxmlformats.org/officeDocument/2006/relationships" xmlns:p="http://schemas.openxmlformats.org/presentationml/2006/main">
+  <p:cSld>
+    <p:spTree>
+      <p:nvGrpSpPr>
+        <p:cNvPr id="1" name=""/>
+        <p:cNvGrpSpPr/>
+        <p:nvPr/>
+      </p:nvGrpSpPr>
+      <p:grpSpPr>
+        <a:xfrm>
+          <a:off x="0" y="0"/>
+          <a:ext cx="0" cy="0"/>
+          <a:chOff x="0" y="0"/>
+          <a:chExt cx="0" cy="0"/>
+        </a:xfrm>
+      </p:grpSpPr>
+      <p:sp>
+        <p:nvSpPr>
+          <p:cNvPr id="2" name="Title 1"/>
+          <p:cNvSpPr>
+            <a:spLocks noGrp="1"/>
+          </p:cNvSpPr>
+          <p:nvPr>
+            <p:ph type="title"/>
+          </p:nvPr>
+        </p:nvSpPr>
+        <p:spPr>
+          <a:xfrm>
+            <a:off x="5055198" y="2387563"/>
+            <a:ext cx="1969546" cy="1194734"/>
+          </a:xfrm>
+        </p:spPr>
+        <p:txBody>
+          <a:bodyPr/>
+          <a:lstStyle/>
+          <a:p>
+            <a:r>
+              <a:rPr lang="en-US" dirty="0" smtClean="0"/>
+              <a:t>Part 2.</a:t>
+            </a:r>
+            <a:endParaRPr lang="en-US" dirty="0"/>
+          </a:p>
+        </p:txBody>
+      </p:sp>
+    </p:spTree>
+    <p:extLst>
+      <p:ext uri="{BB962C8B-B14F-4D97-AF65-F5344CB8AC3E}">
+        <p14:creationId xmlns:p14="http://schemas.microsoft.com/office/powerpoint/2010/main" val="464988874"/>
+      </p:ext>
+    </p:extLst>
+  </p:cSld>
+  <p:clrMapOvr>
+    <a:masterClrMapping/>
+  </p:clrMapOvr>
+</p:sld>
+</file>
+
+<file path=ppt/slides/slide17.xml><?xml version="1.0" encoding="utf-8"?>
+<p:sld xmlns:a="http://schemas.openxmlformats.org/drawingml/2006/main" xmlns:r="http://schemas.openxmlformats.org/officeDocument/2006/relationships" xmlns:p="http://schemas.openxmlformats.org/presentationml/2006/main">
+  <p:cSld>
+    <p:spTree>
+      <p:nvGrpSpPr>
+        <p:cNvPr id="1" name=""/>
+        <p:cNvGrpSpPr/>
+        <p:nvPr/>
+      </p:nvGrpSpPr>
+      <p:grpSpPr>
+        <a:xfrm>
+          <a:off x="0" y="0"/>
+          <a:ext cx="0" cy="0"/>
+          <a:chOff x="0" y="0"/>
+          <a:chExt cx="0" cy="0"/>
+        </a:xfrm>
+      </p:grpSpPr>
+      <p:sp>
+        <p:nvSpPr>
+          <p:cNvPr id="2" name="Title 1"/>
+          <p:cNvSpPr>
+            <a:spLocks noGrp="1"/>
+          </p:cNvSpPr>
+          <p:nvPr>
+            <p:ph type="title"/>
+          </p:nvPr>
+        </p:nvSpPr>
+        <p:spPr>
+          <a:xfrm>
+            <a:off x="5001409" y="2161652"/>
+            <a:ext cx="1948031" cy="1227007"/>
+          </a:xfrm>
+        </p:spPr>
+        <p:txBody>
+          <a:bodyPr/>
+          <a:lstStyle/>
+          <a:p>
+            <a:r>
+              <a:rPr lang="en-US" dirty="0" smtClean="0"/>
+              <a:t>Part 3.</a:t>
+            </a:r>
+            <a:endParaRPr lang="en-US" dirty="0"/>
+          </a:p>
+        </p:txBody>
+      </p:sp>
+    </p:spTree>
+    <p:extLst>
+      <p:ext uri="{BB962C8B-B14F-4D97-AF65-F5344CB8AC3E}">
+        <p14:creationId xmlns:p14="http://schemas.microsoft.com/office/powerpoint/2010/main" val="865513516"/>
       </p:ext>
     </p:extLst>
   </p:cSld>
@@ -3029,10 +3687,40 @@
           <a:chExt cx="0" cy="0"/>
         </a:xfrm>
       </p:grpSpPr>
+      <p:pic>
+        <p:nvPicPr>
+          <p:cNvPr id="2" name="Picture 1"/>
+          <p:cNvPicPr>
+            <a:picLocks noChangeAspect="1"/>
+          </p:cNvPicPr>
+          <p:nvPr/>
+        </p:nvPicPr>
+        <p:blipFill>
+          <a:blip r:embed="rId2">
+            <a:extLst>
+              <a:ext uri="{28A0092B-C50C-407E-A947-70E740481C1C}">
+                <a14:useLocalDpi xmlns:a14="http://schemas.microsoft.com/office/drawing/2010/main" val="0"/>
+              </a:ext>
+            </a:extLst>
+          </a:blip>
+          <a:stretch>
+            <a:fillRect/>
+          </a:stretch>
+        </p:blipFill>
+        <p:spPr>
+          <a:xfrm>
+            <a:off x="1108039" y="214173"/>
+            <a:ext cx="8616876" cy="6212794"/>
+          </a:xfrm>
+          <a:prstGeom prst="rect">
+            <a:avLst/>
+          </a:prstGeom>
+        </p:spPr>
+      </p:pic>
     </p:spTree>
     <p:extLst>
       <p:ext uri="{BB962C8B-B14F-4D97-AF65-F5344CB8AC3E}">
-        <p14:creationId xmlns:p14="http://schemas.microsoft.com/office/powerpoint/2010/main" val="2110949516"/>
+        <p14:creationId xmlns:p14="http://schemas.microsoft.com/office/powerpoint/2010/main" val="454435163"/>
       </p:ext>
     </p:extLst>
   </p:cSld>
@@ -3071,26 +3759,58 @@
         </p:nvSpPr>
         <p:spPr>
           <a:xfrm>
-            <a:off x="5055198" y="2387563"/>
-            <a:ext cx="1969546" cy="1194734"/>
-          </a:xfrm>
-        </p:spPr>
-        <p:txBody>
-          <a:bodyPr/>
-          <a:lstStyle/>
-          <a:p>
-            <a:r>
-              <a:rPr lang="en-US" dirty="0" smtClean="0"/>
-              <a:t>Part 2.</a:t>
-            </a:r>
-            <a:endParaRPr lang="en-US" dirty="0"/>
-          </a:p>
-        </p:txBody>
-      </p:sp>
+            <a:off x="494852" y="87817"/>
+            <a:ext cx="10837433" cy="420183"/>
+          </a:xfrm>
+        </p:spPr>
+        <p:txBody>
+          <a:bodyPr>
+            <a:normAutofit/>
+          </a:bodyPr>
+          <a:lstStyle/>
+          <a:p>
+            <a:r>
+              <a:rPr lang="en-US" sz="2000" dirty="0" smtClean="0"/>
+              <a:t>Field of research? - All</a:t>
+            </a:r>
+            <a:endParaRPr lang="en-US" sz="2000" dirty="0"/>
+          </a:p>
+        </p:txBody>
+      </p:sp>
+      <p:pic>
+        <p:nvPicPr>
+          <p:cNvPr id="3" name="Picture 2"/>
+          <p:cNvPicPr>
+            <a:picLocks noChangeAspect="1"/>
+          </p:cNvPicPr>
+          <p:nvPr/>
+        </p:nvPicPr>
+        <p:blipFill>
+          <a:blip r:embed="rId2">
+            <a:extLst>
+              <a:ext uri="{28A0092B-C50C-407E-A947-70E740481C1C}">
+                <a14:useLocalDpi xmlns:a14="http://schemas.microsoft.com/office/drawing/2010/main" val="0"/>
+              </a:ext>
+            </a:extLst>
+          </a:blip>
+          <a:stretch>
+            <a:fillRect/>
+          </a:stretch>
+        </p:blipFill>
+        <p:spPr>
+          <a:xfrm>
+            <a:off x="2044700" y="508000"/>
+            <a:ext cx="8102600" cy="5842000"/>
+          </a:xfrm>
+          <a:prstGeom prst="rect">
+            <a:avLst/>
+          </a:prstGeom>
+        </p:spPr>
+      </p:pic>
     </p:spTree>
     <p:extLst>
       <p:ext uri="{BB962C8B-B14F-4D97-AF65-F5344CB8AC3E}">
-        <p14:creationId xmlns:p14="http://schemas.microsoft.com/office/powerpoint/2010/main" val="464988874"/>
+        <p14:creationId xmlns:p14="http://schemas.microsoft.com/office/powerpoint/2010/main" val="1601557335"/>
       </p:ext>
     </p:extLst>
   </p:cSld>
@@ -3117,10 +3837,70 @@
           <a:chExt cx="0" cy="0"/>
         </a:xfrm>
       </p:grpSpPr>
+      <p:pic>
+        <p:nvPicPr>
+          <p:cNvPr id="3" name="Picture 2"/>
+          <p:cNvPicPr>
+            <a:picLocks noChangeAspect="1"/>
+          </p:cNvPicPr>
+          <p:nvPr/>
+        </p:nvPicPr>
+        <p:blipFill>
+          <a:blip r:embed="rId2">
+            <a:extLst>
+              <a:ext uri="{28A0092B-C50C-407E-A947-70E740481C1C}">
+                <a14:useLocalDpi xmlns:a14="http://schemas.microsoft.com/office/drawing/2010/main" val="0"/>
+              </a:ext>
+            </a:extLst>
+          </a:blip>
+          <a:stretch>
+            <a:fillRect/>
+          </a:stretch>
+        </p:blipFill>
+        <p:spPr>
+          <a:xfrm>
+            <a:off x="1894093" y="733910"/>
+            <a:ext cx="8102600" cy="5842000"/>
+          </a:xfrm>
+          <a:prstGeom prst="rect">
+            <a:avLst/>
+          </a:prstGeom>
+        </p:spPr>
+      </p:pic>
+      <p:sp>
+        <p:nvSpPr>
+          <p:cNvPr id="4" name="TextBox 3"/>
+          <p:cNvSpPr txBox="1"/>
+          <p:nvPr/>
+        </p:nvSpPr>
+        <p:spPr>
+          <a:xfrm>
+            <a:off x="279700" y="225911"/>
+            <a:ext cx="2719206" cy="369332"/>
+          </a:xfrm>
+          <a:prstGeom prst="rect">
+            <a:avLst/>
+          </a:prstGeom>
+          <a:noFill/>
+        </p:spPr>
+        <p:txBody>
+          <a:bodyPr wrap="none" rtlCol="0">
+            <a:spAutoFit/>
+          </a:bodyPr>
+          <a:lstStyle/>
+          <a:p>
+            <a:r>
+              <a:rPr lang="en-US" dirty="0" smtClean="0"/>
+              <a:t>Field of research? - Canada</a:t>
+            </a:r>
+            <a:endParaRPr lang="en-US" dirty="0"/>
+          </a:p>
+        </p:txBody>
+      </p:sp>
     </p:spTree>
     <p:extLst>
       <p:ext uri="{BB962C8B-B14F-4D97-AF65-F5344CB8AC3E}">
-        <p14:creationId xmlns:p14="http://schemas.microsoft.com/office/powerpoint/2010/main" val="2141344897"/>
+        <p14:creationId xmlns:p14="http://schemas.microsoft.com/office/powerpoint/2010/main" val="879598338"/>
       </p:ext>
     </p:extLst>
   </p:cSld>
@@ -3149,7 +3929,7 @@
       </p:grpSpPr>
       <p:sp>
         <p:nvSpPr>
-          <p:cNvPr id="2" name="Title 1"/>
+          <p:cNvPr id="5" name="Title 4"/>
           <p:cNvSpPr>
             <a:spLocks noGrp="1"/>
           </p:cNvSpPr>
@@ -3159,26 +3939,26 @@
         </p:nvSpPr>
         <p:spPr>
           <a:xfrm>
-            <a:off x="5001409" y="2161652"/>
-            <a:ext cx="1948031" cy="1227007"/>
-          </a:xfrm>
-        </p:spPr>
-        <p:txBody>
-          <a:bodyPr/>
-          <a:lstStyle/>
-          <a:p>
-            <a:r>
-              <a:rPr lang="en-US" dirty="0" smtClean="0"/>
-              <a:t>Part 3.</a:t>
-            </a:r>
-            <a:endParaRPr lang="en-US" dirty="0"/>
+            <a:off x="4624892" y="2150895"/>
+            <a:ext cx="2701066" cy="1517463"/>
+          </a:xfrm>
+        </p:spPr>
+        <p:txBody>
+          <a:bodyPr/>
+          <a:lstStyle/>
+          <a:p>
+            <a:r>
+              <a:rPr lang="en-US" smtClean="0"/>
+              <a:t>Part 1.</a:t>
+            </a:r>
+            <a:endParaRPr lang="en-US"/>
           </a:p>
         </p:txBody>
       </p:sp>
     </p:spTree>
     <p:extLst>
       <p:ext uri="{BB962C8B-B14F-4D97-AF65-F5344CB8AC3E}">
-        <p14:creationId xmlns:p14="http://schemas.microsoft.com/office/powerpoint/2010/main" val="865513516"/>
+        <p14:creationId xmlns:p14="http://schemas.microsoft.com/office/powerpoint/2010/main" val="224123390"/>
       </p:ext>
     </p:extLst>
   </p:cSld>
@@ -3205,10 +3985,69 @@
           <a:chExt cx="0" cy="0"/>
         </a:xfrm>
       </p:grpSpPr>
+      <p:sp>
+        <p:nvSpPr>
+          <p:cNvPr id="3" name="Title 2"/>
+          <p:cNvSpPr>
+            <a:spLocks noGrp="1"/>
+          </p:cNvSpPr>
+          <p:nvPr>
+            <p:ph type="title"/>
+          </p:nvPr>
+        </p:nvSpPr>
+        <p:spPr>
+          <a:xfrm>
+            <a:off x="300318" y="96185"/>
+            <a:ext cx="6078967" cy="469014"/>
+          </a:xfrm>
+        </p:spPr>
+        <p:txBody>
+          <a:bodyPr>
+            <a:normAutofit/>
+          </a:bodyPr>
+          <a:lstStyle/>
+          <a:p>
+            <a:r>
+              <a:rPr lang="en-US" sz="2000" dirty="0" smtClean="0"/>
+              <a:t>What type is your current research?</a:t>
+            </a:r>
+            <a:endParaRPr lang="en-US" sz="2000" dirty="0"/>
+          </a:p>
+        </p:txBody>
+      </p:sp>
+      <p:pic>
+        <p:nvPicPr>
+          <p:cNvPr id="5" name="Content Placeholder 4"/>
+          <p:cNvPicPr>
+            <a:picLocks noGrp="1" noChangeAspect="1"/>
+          </p:cNvPicPr>
+          <p:nvPr>
+            <p:ph idx="1"/>
+          </p:nvPr>
+        </p:nvPicPr>
+        <p:blipFill>
+          <a:blip r:embed="rId2">
+            <a:extLst>
+              <a:ext uri="{28A0092B-C50C-407E-A947-70E740481C1C}">
+                <a14:useLocalDpi xmlns:a14="http://schemas.microsoft.com/office/drawing/2010/main" val="0"/>
+              </a:ext>
+            </a:extLst>
+          </a:blip>
+          <a:stretch>
+            <a:fillRect/>
+          </a:stretch>
+        </p:blipFill>
+        <p:spPr>
+          <a:xfrm>
+            <a:off x="3078442" y="834139"/>
+            <a:ext cx="7410264" cy="5342824"/>
+          </a:xfrm>
+        </p:spPr>
+      </p:pic>
     </p:spTree>
     <p:extLst>
       <p:ext uri="{BB962C8B-B14F-4D97-AF65-F5344CB8AC3E}">
-        <p14:creationId xmlns:p14="http://schemas.microsoft.com/office/powerpoint/2010/main" val="710820581"/>
+        <p14:creationId xmlns:p14="http://schemas.microsoft.com/office/powerpoint/2010/main" val="2110949516"/>
       </p:ext>
     </p:extLst>
   </p:cSld>
@@ -3235,38 +4074,89 @@
           <a:chExt cx="0" cy="0"/>
         </a:xfrm>
       </p:grpSpPr>
-      <p:sp>
-        <p:nvSpPr>
-          <p:cNvPr id="2" name="Title 1"/>
-          <p:cNvSpPr>
-            <a:spLocks noGrp="1"/>
-          </p:cNvSpPr>
-          <p:nvPr>
-            <p:ph type="title"/>
-          </p:nvPr>
-        </p:nvSpPr>
-        <p:spPr>
-          <a:xfrm>
-            <a:off x="4420497" y="2473624"/>
-            <a:ext cx="2776369" cy="1635797"/>
-          </a:xfrm>
-        </p:spPr>
-        <p:txBody>
-          <a:bodyPr/>
-          <a:lstStyle/>
-          <a:p>
-            <a:r>
-              <a:rPr lang="en-US" smtClean="0"/>
-              <a:t>Part 4.</a:t>
-            </a:r>
-            <a:endParaRPr lang="en-US"/>
+      <p:pic>
+        <p:nvPicPr>
+          <p:cNvPr id="2" name="Picture 1"/>
+          <p:cNvPicPr>
+            <a:picLocks noChangeAspect="1"/>
+          </p:cNvPicPr>
+          <p:nvPr/>
+        </p:nvPicPr>
+        <p:blipFill>
+          <a:blip r:embed="rId2">
+            <a:extLst>
+              <a:ext uri="{28A0092B-C50C-407E-A947-70E740481C1C}">
+                <a14:useLocalDpi xmlns:a14="http://schemas.microsoft.com/office/drawing/2010/main" val="0"/>
+              </a:ext>
+            </a:extLst>
+          </a:blip>
+          <a:stretch>
+            <a:fillRect/>
+          </a:stretch>
+        </p:blipFill>
+        <p:spPr>
+          <a:xfrm>
+            <a:off x="2044700" y="508000"/>
+            <a:ext cx="8102600" cy="5842000"/>
+          </a:xfrm>
+          <a:prstGeom prst="rect">
+            <a:avLst/>
+          </a:prstGeom>
+        </p:spPr>
+      </p:pic>
+      <p:sp>
+        <p:nvSpPr>
+          <p:cNvPr id="3" name="Title 2"/>
+          <p:cNvSpPr txBox="1">
+            <a:spLocks/>
+          </p:cNvSpPr>
+          <p:nvPr/>
+        </p:nvSpPr>
+        <p:spPr>
+          <a:xfrm>
+            <a:off x="300318" y="96185"/>
+            <a:ext cx="6078967" cy="469014"/>
+          </a:xfrm>
+          <a:prstGeom prst="rect">
+            <a:avLst/>
+          </a:prstGeom>
+        </p:spPr>
+        <p:txBody>
+          <a:bodyPr>
+            <a:normAutofit/>
+          </a:bodyPr>
+          <a:lstStyle>
+            <a:lvl1pPr algn="l" defTabSz="914400" rtl="0" eaLnBrk="1" latinLnBrk="0" hangingPunct="1">
+              <a:lnSpc>
+                <a:spcPct val="90000"/>
+              </a:lnSpc>
+              <a:spcBef>
+                <a:spcPct val="0"/>
+              </a:spcBef>
+              <a:buNone/>
+              <a:defRPr sz="4400" kern="1200">
+                <a:solidFill>
+                  <a:schemeClr val="tx1"/>
+                </a:solidFill>
+                <a:latin typeface="+mj-lt"/>
+                <a:ea typeface="+mj-ea"/>
+                <a:cs typeface="+mj-cs"/>
+              </a:defRPr>
+            </a:lvl1pPr>
+          </a:lstStyle>
+          <a:p>
+            <a:r>
+              <a:rPr lang="en-US" sz="2000" dirty="0" smtClean="0"/>
+              <a:t>What type is your current research? - Canada</a:t>
+            </a:r>
+            <a:endParaRPr lang="en-US" sz="2000" dirty="0"/>
           </a:p>
         </p:txBody>
       </p:sp>
     </p:spTree>
     <p:extLst>
       <p:ext uri="{BB962C8B-B14F-4D97-AF65-F5344CB8AC3E}">
-        <p14:creationId xmlns:p14="http://schemas.microsoft.com/office/powerpoint/2010/main" val="2128973067"/>
+        <p14:creationId xmlns:p14="http://schemas.microsoft.com/office/powerpoint/2010/main" val="1453563632"/>
       </p:ext>
     </p:extLst>
   </p:cSld>
@@ -3293,29 +4183,168 @@
           <a:chExt cx="0" cy="0"/>
         </a:xfrm>
       </p:grpSpPr>
-      <p:sp>
-        <p:nvSpPr>
-          <p:cNvPr id="2" name="Title 1"/>
-          <p:cNvSpPr>
-            <a:spLocks noGrp="1"/>
-          </p:cNvSpPr>
-          <p:nvPr>
-            <p:ph type="title"/>
-          </p:nvPr>
-        </p:nvSpPr>
-        <p:spPr/>
-        <p:txBody>
-          <a:bodyPr/>
-          <a:lstStyle/>
-          <a:p>
-            <a:endParaRPr lang="en-US"/>
+      <p:pic>
+        <p:nvPicPr>
+          <p:cNvPr id="2" name="Picture 1"/>
+          <p:cNvPicPr>
+            <a:picLocks noChangeAspect="1"/>
+          </p:cNvPicPr>
+          <p:nvPr/>
+        </p:nvPicPr>
+        <p:blipFill>
+          <a:blip r:embed="rId2">
+            <a:extLst>
+              <a:ext uri="{28A0092B-C50C-407E-A947-70E740481C1C}">
+                <a14:useLocalDpi xmlns:a14="http://schemas.microsoft.com/office/drawing/2010/main" val="0"/>
+              </a:ext>
+            </a:extLst>
+          </a:blip>
+          <a:stretch>
+            <a:fillRect/>
+          </a:stretch>
+        </p:blipFill>
+        <p:spPr>
+          <a:xfrm>
+            <a:off x="2044700" y="508000"/>
+            <a:ext cx="8102600" cy="5842000"/>
+          </a:xfrm>
+          <a:prstGeom prst="rect">
+            <a:avLst/>
+          </a:prstGeom>
+        </p:spPr>
+      </p:pic>
+      <p:sp>
+        <p:nvSpPr>
+          <p:cNvPr id="3" name="TextBox 2"/>
+          <p:cNvSpPr txBox="1"/>
+          <p:nvPr/>
+        </p:nvSpPr>
+        <p:spPr>
+          <a:xfrm>
+            <a:off x="537882" y="138668"/>
+            <a:ext cx="3760645" cy="369332"/>
+          </a:xfrm>
+          <a:prstGeom prst="rect">
+            <a:avLst/>
+          </a:prstGeom>
+          <a:noFill/>
+        </p:spPr>
+        <p:txBody>
+          <a:bodyPr wrap="none" rtlCol="0">
+            <a:spAutoFit/>
+          </a:bodyPr>
+          <a:lstStyle/>
+          <a:p>
+            <a:r>
+              <a:rPr lang="en-US" dirty="0" smtClean="0"/>
+              <a:t>Change in type in the past 10 </a:t>
+            </a:r>
+            <a:r>
+              <a:rPr lang="en-US" dirty="0" err="1" smtClean="0"/>
+              <a:t>yrs</a:t>
+            </a:r>
+            <a:r>
+              <a:rPr lang="en-US" dirty="0" smtClean="0"/>
+              <a:t>?  -All</a:t>
+            </a:r>
+            <a:endParaRPr lang="en-US" dirty="0"/>
           </a:p>
         </p:txBody>
       </p:sp>
     </p:spTree>
     <p:extLst>
       <p:ext uri="{BB962C8B-B14F-4D97-AF65-F5344CB8AC3E}">
-        <p14:creationId xmlns:p14="http://schemas.microsoft.com/office/powerpoint/2010/main" val="535910707"/>
+        <p14:creationId xmlns:p14="http://schemas.microsoft.com/office/powerpoint/2010/main" val="1873490486"/>
+      </p:ext>
+    </p:extLst>
+  </p:cSld>
+  <p:clrMapOvr>
+    <a:masterClrMapping/>
+  </p:clrMapOvr>
+</p:sld>
+</file>
+
+<file path=ppt/slides/slide9.xml><?xml version="1.0" encoding="utf-8"?>
+<p:sld xmlns:a="http://schemas.openxmlformats.org/drawingml/2006/main" xmlns:r="http://schemas.openxmlformats.org/officeDocument/2006/relationships" xmlns:p="http://schemas.openxmlformats.org/presentationml/2006/main">
+  <p:cSld>
+    <p:spTree>
+      <p:nvGrpSpPr>
+        <p:cNvPr id="1" name=""/>
+        <p:cNvGrpSpPr/>
+        <p:nvPr/>
+      </p:nvGrpSpPr>
+      <p:grpSpPr>
+        <a:xfrm>
+          <a:off x="0" y="0"/>
+          <a:ext cx="0" cy="0"/>
+          <a:chOff x="0" y="0"/>
+          <a:chExt cx="0" cy="0"/>
+        </a:xfrm>
+      </p:grpSpPr>
+      <p:pic>
+        <p:nvPicPr>
+          <p:cNvPr id="2" name="Picture 1"/>
+          <p:cNvPicPr>
+            <a:picLocks noChangeAspect="1"/>
+          </p:cNvPicPr>
+          <p:nvPr/>
+        </p:nvPicPr>
+        <p:blipFill>
+          <a:blip r:embed="rId2">
+            <a:extLst>
+              <a:ext uri="{28A0092B-C50C-407E-A947-70E740481C1C}">
+                <a14:useLocalDpi xmlns:a14="http://schemas.microsoft.com/office/drawing/2010/main" val="0"/>
+              </a:ext>
+            </a:extLst>
+          </a:blip>
+          <a:stretch>
+            <a:fillRect/>
+          </a:stretch>
+        </p:blipFill>
+        <p:spPr>
+          <a:xfrm>
+            <a:off x="2044700" y="508000"/>
+            <a:ext cx="8102600" cy="5842000"/>
+          </a:xfrm>
+          <a:prstGeom prst="rect">
+            <a:avLst/>
+          </a:prstGeom>
+        </p:spPr>
+      </p:pic>
+      <p:sp>
+        <p:nvSpPr>
+          <p:cNvPr id="3" name="TextBox 2"/>
+          <p:cNvSpPr txBox="1"/>
+          <p:nvPr/>
+        </p:nvSpPr>
+        <p:spPr>
+          <a:xfrm>
+            <a:off x="591671" y="258184"/>
+            <a:ext cx="4352538" cy="369332"/>
+          </a:xfrm>
+          <a:prstGeom prst="rect">
+            <a:avLst/>
+          </a:prstGeom>
+          <a:noFill/>
+        </p:spPr>
+        <p:txBody>
+          <a:bodyPr wrap="none" rtlCol="0">
+            <a:spAutoFit/>
+          </a:bodyPr>
+          <a:lstStyle/>
+          <a:p>
+            <a:r>
+              <a:rPr lang="en-US" dirty="0" smtClean="0"/>
+              <a:t>What type was your past research? - Canada</a:t>
+            </a:r>
+            <a:endParaRPr lang="en-US" dirty="0"/>
+          </a:p>
+        </p:txBody>
+      </p:sp>
+    </p:spTree>
+    <p:extLst>
+      <p:ext uri="{BB962C8B-B14F-4D97-AF65-F5344CB8AC3E}">
+        <p14:creationId xmlns:p14="http://schemas.microsoft.com/office/powerpoint/2010/main" val="1365167296"/>
       </p:ext>
     </p:extLst>
   </p:cSld>

</xml_diff>